<commit_message>
First pass through the paper
Much more work needed.  Shiva, there are some todos for you.
</commit_message>
<xml_diff>
--- a/papers/RSS2016/code/CircleFill.pptx
+++ b/papers/RSS2016/code/CircleFill.pptx
@@ -3763,6 +3763,139 @@
           </a:prstGeom>
         </p:spPr>
       </p:pic>
+      <p:sp>
+        <p:nvSpPr>
+          <p:cNvPr id="123" name="Rectangle 122"/>
+          <p:cNvSpPr/>
+          <p:nvPr/>
+        </p:nvSpPr>
+        <p:spPr>
+          <a:xfrm>
+            <a:off x="2984694" y="2126775"/>
+            <a:ext cx="901961" cy="369332"/>
+          </a:xfrm>
+          <a:prstGeom prst="rect">
+            <a:avLst/>
+          </a:prstGeom>
+        </p:spPr>
+        <p:txBody>
+          <a:bodyPr wrap="square">
+            <a:spAutoFit/>
+          </a:bodyPr>
+          <a:lstStyle/>
+          <a:p>
+            <a:r>
+              <a:rPr lang="en-US" i="1" dirty="0">
+                <a:latin typeface="Times New Roman"/>
+                <a:cs typeface="Times New Roman"/>
+              </a:rPr>
+              <a:t>β</a:t>
+            </a:r>
+            <a:r>
+              <a:rPr lang="en-US" dirty="0" smtClean="0">
+                <a:effectLst/>
+                <a:latin typeface="Times New Roman"/>
+                <a:cs typeface="Times New Roman"/>
+              </a:rPr>
+              <a:t> </a:t>
+            </a:r>
+            <a:endParaRPr lang="en-US" dirty="0">
+              <a:latin typeface="Times New Roman"/>
+              <a:cs typeface="Times New Roman"/>
+            </a:endParaRPr>
+          </a:p>
+        </p:txBody>
+      </p:sp>
+      <p:sp>
+        <p:nvSpPr>
+          <p:cNvPr id="124" name="Circular Arrow 123"/>
+          <p:cNvSpPr/>
+          <p:nvPr/>
+        </p:nvSpPr>
+        <p:spPr>
+          <a:xfrm rot="8316779" flipH="1">
+            <a:off x="1978256" y="1585304"/>
+            <a:ext cx="1397845" cy="1589615"/>
+          </a:xfrm>
+          <a:prstGeom prst="circularArrow">
+            <a:avLst>
+              <a:gd name="adj1" fmla="val 4666"/>
+              <a:gd name="adj2" fmla="val 893644"/>
+              <a:gd name="adj3" fmla="val 20535443"/>
+              <a:gd name="adj4" fmla="val 18647894"/>
+              <a:gd name="adj5" fmla="val 5581"/>
+            </a:avLst>
+          </a:prstGeom>
+          <a:solidFill>
+            <a:schemeClr val="tx1"/>
+          </a:solidFill>
+          <a:ln>
+            <a:noFill/>
+          </a:ln>
+        </p:spPr>
+        <p:style>
+          <a:lnRef idx="1">
+            <a:schemeClr val="accent1"/>
+          </a:lnRef>
+          <a:fillRef idx="3">
+            <a:schemeClr val="accent1"/>
+          </a:fillRef>
+          <a:effectRef idx="2">
+            <a:schemeClr val="accent1"/>
+          </a:effectRef>
+          <a:fontRef idx="minor">
+            <a:schemeClr val="lt1"/>
+          </a:fontRef>
+        </p:style>
+        <p:txBody>
+          <a:bodyPr rtlCol="0" anchor="ctr"/>
+          <a:lstStyle/>
+          <a:p>
+            <a:pPr algn="ctr"/>
+            <a:endParaRPr lang="en-US">
+              <a:solidFill>
+                <a:schemeClr val="tx1"/>
+              </a:solidFill>
+            </a:endParaRPr>
+          </a:p>
+        </p:txBody>
+      </p:sp>
+      <p:cxnSp>
+        <p:nvCxnSpPr>
+          <p:cNvPr id="126" name="Straight Connector 125"/>
+          <p:cNvCxnSpPr/>
+          <p:nvPr/>
+        </p:nvCxnSpPr>
+        <p:spPr>
+          <a:xfrm>
+            <a:off x="2652889" y="2486090"/>
+            <a:ext cx="1233766" cy="0"/>
+          </a:xfrm>
+          <a:prstGeom prst="line">
+            <a:avLst/>
+          </a:prstGeom>
+          <a:ln>
+            <a:solidFill>
+              <a:schemeClr val="tx1"/>
+            </a:solidFill>
+          </a:ln>
+          <a:effectLst/>
+        </p:spPr>
+        <p:style>
+          <a:lnRef idx="2">
+            <a:schemeClr val="accent1"/>
+          </a:lnRef>
+          <a:fillRef idx="0">
+            <a:schemeClr val="accent1"/>
+          </a:fillRef>
+          <a:effectRef idx="1">
+            <a:schemeClr val="accent1"/>
+          </a:effectRef>
+          <a:fontRef idx="minor">
+            <a:schemeClr val="tx1"/>
+          </a:fontRef>
+        </p:style>
+      </p:cxnSp>
     </p:spTree>
     <p:extLst>
       <p:ext uri="{BB962C8B-B14F-4D97-AF65-F5344CB8AC3E}">

</xml_diff>